<commit_message>
Deployed 7b10eb2 with MkDocs version: 1.1.2
</commit_message>
<xml_diff>
--- a/slides/Unit10_Assertion.pptx
+++ b/slides/Unit10_Assertion.pptx
@@ -181,16 +181,70 @@
 </p:presentation>
 </file>
 
-<file path=ppt/revisionInfo.xml><?xml version="1.0" encoding="utf-8"?>
-<p1510:revInfo xmlns:a="http://schemas.openxmlformats.org/drawingml/2006/main" xmlns:r="http://schemas.openxmlformats.org/officeDocument/2006/relationships" xmlns:p1510="http://schemas.microsoft.com/office/powerpoint/2015/10/main">
-  <p1510:revLst>
-    <p1510:client id="{B818F035-38C0-4785-860F-E3D12C1A82D0}" v="26" dt="2021-01-27T12:12:53.335"/>
-  </p1510:revLst>
-</p1510:revInfo>
-</file>
-
 <file path=ppt/changesInfos/changesInfo1.xml><?xml version="1.0" encoding="utf-8"?>
 <pc:chgInfo xmlns:a="http://schemas.openxmlformats.org/drawingml/2006/main" xmlns:r="http://schemas.openxmlformats.org/officeDocument/2006/relationships" xmlns:ac="http://schemas.microsoft.com/office/drawing/2013/main/command" xmlns:pc="http://schemas.microsoft.com/office/powerpoint/2013/main/command">
+  <pc:docChgLst>
+    <pc:chgData name="Zhao Jin" userId="cd05a825-544c-438a-9ba1-08e63db50b47" providerId="ADAL" clId="{6C895CEF-6BD3-4735-8300-A79BACD2AEC1}"/>
+    <pc:docChg chg="undo custSel modSld">
+      <pc:chgData name="Zhao Jin" userId="cd05a825-544c-438a-9ba1-08e63db50b47" providerId="ADAL" clId="{6C895CEF-6BD3-4735-8300-A79BACD2AEC1}" dt="2021-02-01T05:30:09.978" v="66" actId="20577"/>
+      <pc:docMkLst>
+        <pc:docMk/>
+      </pc:docMkLst>
+      <pc:sldChg chg="modSp mod">
+        <pc:chgData name="Zhao Jin" userId="cd05a825-544c-438a-9ba1-08e63db50b47" providerId="ADAL" clId="{6C895CEF-6BD3-4735-8300-A79BACD2AEC1}" dt="2021-02-01T05:29:37.697" v="62" actId="20577"/>
+        <pc:sldMkLst>
+          <pc:docMk/>
+          <pc:sldMk cId="3226898961" sldId="552"/>
+        </pc:sldMkLst>
+        <pc:spChg chg="mod">
+          <ac:chgData name="Zhao Jin" userId="cd05a825-544c-438a-9ba1-08e63db50b47" providerId="ADAL" clId="{6C895CEF-6BD3-4735-8300-A79BACD2AEC1}" dt="2021-02-01T05:29:37.697" v="62" actId="20577"/>
+          <ac:spMkLst>
+            <pc:docMk/>
+            <pc:sldMk cId="3226898961" sldId="552"/>
+            <ac:spMk id="8" creationId="{00000000-0000-0000-0000-000000000000}"/>
+          </ac:spMkLst>
+        </pc:spChg>
+        <pc:spChg chg="mod">
+          <ac:chgData name="Zhao Jin" userId="cd05a825-544c-438a-9ba1-08e63db50b47" providerId="ADAL" clId="{6C895CEF-6BD3-4735-8300-A79BACD2AEC1}" dt="2021-02-01T05:29:07.497" v="14" actId="1035"/>
+          <ac:spMkLst>
+            <pc:docMk/>
+            <pc:sldMk cId="3226898961" sldId="552"/>
+            <ac:spMk id="16" creationId="{D2096CE0-F283-4186-90FF-7C54FF151885}"/>
+          </ac:spMkLst>
+        </pc:spChg>
+      </pc:sldChg>
+      <pc:sldChg chg="modSp mod">
+        <pc:chgData name="Zhao Jin" userId="cd05a825-544c-438a-9ba1-08e63db50b47" providerId="ADAL" clId="{6C895CEF-6BD3-4735-8300-A79BACD2AEC1}" dt="2021-02-01T05:30:03.548" v="64" actId="20577"/>
+        <pc:sldMkLst>
+          <pc:docMk/>
+          <pc:sldMk cId="3959984611" sldId="553"/>
+        </pc:sldMkLst>
+        <pc:spChg chg="mod">
+          <ac:chgData name="Zhao Jin" userId="cd05a825-544c-438a-9ba1-08e63db50b47" providerId="ADAL" clId="{6C895CEF-6BD3-4735-8300-A79BACD2AEC1}" dt="2021-02-01T05:30:03.548" v="64" actId="20577"/>
+          <ac:spMkLst>
+            <pc:docMk/>
+            <pc:sldMk cId="3959984611" sldId="553"/>
+            <ac:spMk id="8" creationId="{00000000-0000-0000-0000-000000000000}"/>
+          </ac:spMkLst>
+        </pc:spChg>
+      </pc:sldChg>
+      <pc:sldChg chg="modSp mod">
+        <pc:chgData name="Zhao Jin" userId="cd05a825-544c-438a-9ba1-08e63db50b47" providerId="ADAL" clId="{6C895CEF-6BD3-4735-8300-A79BACD2AEC1}" dt="2021-02-01T05:30:09.978" v="66" actId="20577"/>
+        <pc:sldMkLst>
+          <pc:docMk/>
+          <pc:sldMk cId="4088633470" sldId="554"/>
+        </pc:sldMkLst>
+        <pc:spChg chg="mod">
+          <ac:chgData name="Zhao Jin" userId="cd05a825-544c-438a-9ba1-08e63db50b47" providerId="ADAL" clId="{6C895CEF-6BD3-4735-8300-A79BACD2AEC1}" dt="2021-02-01T05:30:09.978" v="66" actId="20577"/>
+          <ac:spMkLst>
+            <pc:docMk/>
+            <pc:sldMk cId="4088633470" sldId="554"/>
+            <ac:spMk id="30" creationId="{C70A47A0-816F-405E-B986-DCD3BF78F602}"/>
+          </ac:spMkLst>
+        </pc:spChg>
+      </pc:sldChg>
+    </pc:docChg>
+  </pc:docChgLst>
   <pc:docChgLst>
     <pc:chgData name="Zhao Jin" userId="cd05a825-544c-438a-9ba1-08e63db50b47" providerId="ADAL" clId="{FE12A2CA-5881-C848-8765-9A159F9DF6E8}"/>
     <pc:docChg chg="modSld modMainMaster">
@@ -2938,7 +2992,7 @@
               <a:pPr>
                 <a:defRPr/>
               </a:pPr>
-              <a:t>1/29/2021</a:t>
+              <a:t>2/1/2021</a:t>
             </a:fld>
             <a:endParaRPr lang="en-US" dirty="0"/>
           </a:p>
@@ -8290,7 +8344,15 @@
             </a:pPr>
             <a:r>
               <a:rPr lang="en-US" dirty="0"/>
-              <a:t>Can be written anywhere in the code and checked automatically</a:t>
+              <a:t>Can be written anywhere in the code and checked automatically (e.g., using assert() from </a:t>
+            </a:r>
+            <a:r>
+              <a:rPr lang="en-US" dirty="0" err="1"/>
+              <a:t>assert.h</a:t>
+            </a:r>
+            <a:r>
+              <a:rPr lang="en-US" dirty="0"/>
+              <a:t>)</a:t>
             </a:r>
           </a:p>
           <a:p>
@@ -8366,7 +8428,7 @@
         </p:nvSpPr>
         <p:spPr>
           <a:xfrm>
-            <a:off x="942258" y="4128385"/>
+            <a:off x="942258" y="3970726"/>
             <a:ext cx="7519833" cy="2554545"/>
           </a:xfrm>
           <a:prstGeom prst="rect">
@@ -9099,7 +9161,7 @@
             </a:pPr>
             <a:r>
               <a:rPr lang="en-US" dirty="0"/>
-              <a:t>Important: Write an assertion based on </a:t>
+              <a:t>Important: Write assertions based on </a:t>
             </a:r>
             <a:r>
               <a:rPr lang="en-US" dirty="0">
@@ -10395,7 +10457,15 @@
             </a:pPr>
             <a:r>
               <a:rPr lang="en-US" dirty="0"/>
-              <a:t>Important: Write an assertion based on your </a:t>
+              <a:t>Important</a:t>
+            </a:r>
+            <a:r>
+              <a:rPr lang="en-US"/>
+              <a:t>: Write assertions </a:t>
+            </a:r>
+            <a:r>
+              <a:rPr lang="en-US" dirty="0"/>
+              <a:t>based on your </a:t>
             </a:r>
             <a:r>
               <a:rPr lang="en-US" dirty="0">

</xml_diff>